<commit_message>
Updated the paper, done all the changes mentioned.
require few inputs from geophysics people. Will send it to them and ask
them after you have verified it once. Thank you.
</commit_message>
<xml_diff>
--- a/Seismic Drones/CASE-2016/pictures/SeismicDrone.pptx
+++ b/Seismic Drones/CASE-2016/pictures/SeismicDrone.pptx
@@ -243,7 +243,7 @@
           <a:p>
             <a:fld id="{72A6CF2C-CEEB-4F05-A35E-FAC0B9832724}" type="datetimeFigureOut">
               <a:rPr lang="en-US" smtClean="0"/>
-              <a:t>2/22/2016</a:t>
+              <a:t>3/5/2016</a:t>
             </a:fld>
             <a:endParaRPr lang="en-US"/>
           </a:p>
@@ -413,7 +413,7 @@
           <a:p>
             <a:fld id="{72A6CF2C-CEEB-4F05-A35E-FAC0B9832724}" type="datetimeFigureOut">
               <a:rPr lang="en-US" smtClean="0"/>
-              <a:t>2/22/2016</a:t>
+              <a:t>3/5/2016</a:t>
             </a:fld>
             <a:endParaRPr lang="en-US"/>
           </a:p>
@@ -593,7 +593,7 @@
           <a:p>
             <a:fld id="{72A6CF2C-CEEB-4F05-A35E-FAC0B9832724}" type="datetimeFigureOut">
               <a:rPr lang="en-US" smtClean="0"/>
-              <a:t>2/22/2016</a:t>
+              <a:t>3/5/2016</a:t>
             </a:fld>
             <a:endParaRPr lang="en-US"/>
           </a:p>
@@ -763,7 +763,7 @@
           <a:p>
             <a:fld id="{72A6CF2C-CEEB-4F05-A35E-FAC0B9832724}" type="datetimeFigureOut">
               <a:rPr lang="en-US" smtClean="0"/>
-              <a:t>2/22/2016</a:t>
+              <a:t>3/5/2016</a:t>
             </a:fld>
             <a:endParaRPr lang="en-US"/>
           </a:p>
@@ -1009,7 +1009,7 @@
           <a:p>
             <a:fld id="{72A6CF2C-CEEB-4F05-A35E-FAC0B9832724}" type="datetimeFigureOut">
               <a:rPr lang="en-US" smtClean="0"/>
-              <a:t>2/22/2016</a:t>
+              <a:t>3/5/2016</a:t>
             </a:fld>
             <a:endParaRPr lang="en-US"/>
           </a:p>
@@ -1241,7 +1241,7 @@
           <a:p>
             <a:fld id="{72A6CF2C-CEEB-4F05-A35E-FAC0B9832724}" type="datetimeFigureOut">
               <a:rPr lang="en-US" smtClean="0"/>
-              <a:t>2/22/2016</a:t>
+              <a:t>3/5/2016</a:t>
             </a:fld>
             <a:endParaRPr lang="en-US"/>
           </a:p>
@@ -1608,7 +1608,7 @@
           <a:p>
             <a:fld id="{72A6CF2C-CEEB-4F05-A35E-FAC0B9832724}" type="datetimeFigureOut">
               <a:rPr lang="en-US" smtClean="0"/>
-              <a:t>2/22/2016</a:t>
+              <a:t>3/5/2016</a:t>
             </a:fld>
             <a:endParaRPr lang="en-US"/>
           </a:p>
@@ -1726,7 +1726,7 @@
           <a:p>
             <a:fld id="{72A6CF2C-CEEB-4F05-A35E-FAC0B9832724}" type="datetimeFigureOut">
               <a:rPr lang="en-US" smtClean="0"/>
-              <a:t>2/22/2016</a:t>
+              <a:t>3/5/2016</a:t>
             </a:fld>
             <a:endParaRPr lang="en-US"/>
           </a:p>
@@ -1821,7 +1821,7 @@
           <a:p>
             <a:fld id="{72A6CF2C-CEEB-4F05-A35E-FAC0B9832724}" type="datetimeFigureOut">
               <a:rPr lang="en-US" smtClean="0"/>
-              <a:t>2/22/2016</a:t>
+              <a:t>3/5/2016</a:t>
             </a:fld>
             <a:endParaRPr lang="en-US"/>
           </a:p>
@@ -2098,7 +2098,7 @@
           <a:p>
             <a:fld id="{72A6CF2C-CEEB-4F05-A35E-FAC0B9832724}" type="datetimeFigureOut">
               <a:rPr lang="en-US" smtClean="0"/>
-              <a:t>2/22/2016</a:t>
+              <a:t>3/5/2016</a:t>
             </a:fld>
             <a:endParaRPr lang="en-US"/>
           </a:p>
@@ -2351,7 +2351,7 @@
           <a:p>
             <a:fld id="{72A6CF2C-CEEB-4F05-A35E-FAC0B9832724}" type="datetimeFigureOut">
               <a:rPr lang="en-US" smtClean="0"/>
-              <a:t>2/22/2016</a:t>
+              <a:t>3/5/2016</a:t>
             </a:fld>
             <a:endParaRPr lang="en-US"/>
           </a:p>
@@ -2564,7 +2564,7 @@
           <a:p>
             <a:fld id="{72A6CF2C-CEEB-4F05-A35E-FAC0B9832724}" type="datetimeFigureOut">
               <a:rPr lang="en-US" smtClean="0"/>
-              <a:t>2/22/2016</a:t>
+              <a:t>3/5/2016</a:t>
             </a:fld>
             <a:endParaRPr lang="en-US"/>
           </a:p>
@@ -2977,7 +2977,7 @@
         </p:nvSpPr>
         <p:spPr>
           <a:xfrm>
-            <a:off x="0" y="726924"/>
+            <a:off x="5901" y="726056"/>
             <a:ext cx="12192000" cy="3696923"/>
           </a:xfrm>
           <a:prstGeom prst="rect">
@@ -3082,113 +3082,6 @@
           </a:p>
         </p:txBody>
       </p:sp>
-      <p:grpSp>
-        <p:nvGrpSpPr>
-          <p:cNvPr id="8" name="Group 7"/>
-          <p:cNvGrpSpPr>
-            <a:grpSpLocks noChangeAspect="1"/>
-          </p:cNvGrpSpPr>
-          <p:nvPr/>
-        </p:nvGrpSpPr>
-        <p:grpSpPr>
-          <a:xfrm rot="3653352">
-            <a:off x="330726" y="2598731"/>
-            <a:ext cx="822055" cy="1541354"/>
-            <a:chOff x="1201271" y="1021976"/>
-            <a:chExt cx="1506070" cy="2823883"/>
-          </a:xfrm>
-        </p:grpSpPr>
-        <p:sp>
-          <p:nvSpPr>
-            <p:cNvPr id="5" name="Rounded Rectangle 4"/>
-            <p:cNvSpPr/>
-            <p:nvPr/>
-          </p:nvSpPr>
-          <p:spPr>
-            <a:xfrm>
-              <a:off x="1201271" y="1021976"/>
-              <a:ext cx="1506070" cy="833718"/>
-            </a:xfrm>
-            <a:prstGeom prst="roundRect">
-              <a:avLst/>
-            </a:prstGeom>
-            <a:solidFill>
-              <a:schemeClr val="bg1">
-                <a:lumMod val="50000"/>
-              </a:schemeClr>
-            </a:solidFill>
-          </p:spPr>
-          <p:style>
-            <a:lnRef idx="2">
-              <a:schemeClr val="accent1">
-                <a:shade val="50000"/>
-              </a:schemeClr>
-            </a:lnRef>
-            <a:fillRef idx="1">
-              <a:schemeClr val="accent1"/>
-            </a:fillRef>
-            <a:effectRef idx="0">
-              <a:schemeClr val="accent1"/>
-            </a:effectRef>
-            <a:fontRef idx="minor">
-              <a:schemeClr val="lt1"/>
-            </a:fontRef>
-          </p:style>
-          <p:txBody>
-            <a:bodyPr rtlCol="0" anchor="ctr"/>
-            <a:lstStyle/>
-            <a:p>
-              <a:pPr algn="ctr"/>
-              <a:endParaRPr lang="en-US"/>
-            </a:p>
-          </p:txBody>
-        </p:sp>
-        <p:sp>
-          <p:nvSpPr>
-            <p:cNvPr id="7" name="Rectangle 6"/>
-            <p:cNvSpPr/>
-            <p:nvPr/>
-          </p:nvSpPr>
-          <p:spPr>
-            <a:xfrm>
-              <a:off x="1775012" y="1855694"/>
-              <a:ext cx="358588" cy="1990165"/>
-            </a:xfrm>
-            <a:prstGeom prst="rect">
-              <a:avLst/>
-            </a:prstGeom>
-            <a:solidFill>
-              <a:schemeClr val="accent2">
-                <a:lumMod val="75000"/>
-              </a:schemeClr>
-            </a:solidFill>
-          </p:spPr>
-          <p:style>
-            <a:lnRef idx="2">
-              <a:schemeClr val="accent1">
-                <a:shade val="50000"/>
-              </a:schemeClr>
-            </a:lnRef>
-            <a:fillRef idx="1">
-              <a:schemeClr val="accent1"/>
-            </a:fillRef>
-            <a:effectRef idx="0">
-              <a:schemeClr val="accent1"/>
-            </a:effectRef>
-            <a:fontRef idx="minor">
-              <a:schemeClr val="lt1"/>
-            </a:fontRef>
-          </p:style>
-          <p:txBody>
-            <a:bodyPr rtlCol="0" anchor="ctr"/>
-            <a:lstStyle/>
-            <a:p>
-              <a:pPr algn="ctr"/>
-              <a:endParaRPr lang="en-US"/>
-            </a:p>
-          </p:txBody>
-        </p:sp>
-      </p:grpSp>
       <p:grpSp>
         <p:nvGrpSpPr>
           <p:cNvPr id="6" name="Group 5"/>
@@ -3322,160 +3215,6 @@
           </a:fontRef>
         </p:style>
       </p:cxnSp>
-      <p:sp>
-        <p:nvSpPr>
-          <p:cNvPr id="57" name="Multiply 56"/>
-          <p:cNvSpPr/>
-          <p:nvPr/>
-        </p:nvSpPr>
-        <p:spPr>
-          <a:xfrm>
-            <a:off x="1551919" y="4049359"/>
-            <a:ext cx="560439" cy="737419"/>
-          </a:xfrm>
-          <a:prstGeom prst="mathMultiply">
-            <a:avLst/>
-          </a:prstGeom>
-          <a:solidFill>
-            <a:srgbClr val="FF0000"/>
-          </a:solidFill>
-        </p:spPr>
-        <p:style>
-          <a:lnRef idx="2">
-            <a:schemeClr val="accent1">
-              <a:shade val="50000"/>
-            </a:schemeClr>
-          </a:lnRef>
-          <a:fillRef idx="1">
-            <a:schemeClr val="accent1"/>
-          </a:fillRef>
-          <a:effectRef idx="0">
-            <a:schemeClr val="accent1"/>
-          </a:effectRef>
-          <a:fontRef idx="minor">
-            <a:schemeClr val="lt1"/>
-          </a:fontRef>
-        </p:style>
-        <p:txBody>
-          <a:bodyPr rtlCol="0" anchor="ctr"/>
-          <a:lstStyle/>
-          <a:p>
-            <a:pPr algn="ctr"/>
-            <a:endParaRPr lang="en-US"/>
-          </a:p>
-        </p:txBody>
-      </p:sp>
-      <p:cxnSp>
-        <p:nvCxnSpPr>
-          <p:cNvPr id="59" name="Straight Arrow Connector 58"/>
-          <p:cNvCxnSpPr/>
-          <p:nvPr/>
-        </p:nvCxnSpPr>
-        <p:spPr>
-          <a:xfrm>
-            <a:off x="1372865" y="3574971"/>
-            <a:ext cx="280219" cy="557970"/>
-          </a:xfrm>
-          <a:prstGeom prst="straightConnector1">
-            <a:avLst/>
-          </a:prstGeom>
-          <a:ln>
-            <a:solidFill>
-              <a:schemeClr val="tx1"/>
-            </a:solidFill>
-            <a:prstDash val="dash"/>
-            <a:tailEnd type="triangle"/>
-          </a:ln>
-        </p:spPr>
-        <p:style>
-          <a:lnRef idx="1">
-            <a:schemeClr val="accent1"/>
-          </a:lnRef>
-          <a:fillRef idx="0">
-            <a:schemeClr val="accent1"/>
-          </a:fillRef>
-          <a:effectRef idx="0">
-            <a:schemeClr val="accent1"/>
-          </a:effectRef>
-          <a:fontRef idx="minor">
-            <a:schemeClr val="tx1"/>
-          </a:fontRef>
-        </p:style>
-      </p:cxnSp>
-      <p:cxnSp>
-        <p:nvCxnSpPr>
-          <p:cNvPr id="61" name="Straight Arrow Connector 60"/>
-          <p:cNvCxnSpPr/>
-          <p:nvPr/>
-        </p:nvCxnSpPr>
-        <p:spPr>
-          <a:xfrm>
-            <a:off x="1486749" y="3527039"/>
-            <a:ext cx="280219" cy="557970"/>
-          </a:xfrm>
-          <a:prstGeom prst="straightConnector1">
-            <a:avLst/>
-          </a:prstGeom>
-          <a:ln>
-            <a:solidFill>
-              <a:schemeClr val="tx1"/>
-            </a:solidFill>
-            <a:prstDash val="dash"/>
-            <a:tailEnd type="triangle"/>
-          </a:ln>
-        </p:spPr>
-        <p:style>
-          <a:lnRef idx="1">
-            <a:schemeClr val="accent1"/>
-          </a:lnRef>
-          <a:fillRef idx="0">
-            <a:schemeClr val="accent1"/>
-          </a:fillRef>
-          <a:effectRef idx="0">
-            <a:schemeClr val="accent1"/>
-          </a:effectRef>
-          <a:fontRef idx="minor">
-            <a:schemeClr val="tx1"/>
-          </a:fontRef>
-        </p:style>
-      </p:cxnSp>
-      <p:cxnSp>
-        <p:nvCxnSpPr>
-          <p:cNvPr id="62" name="Straight Arrow Connector 61"/>
-          <p:cNvCxnSpPr/>
-          <p:nvPr/>
-        </p:nvCxnSpPr>
-        <p:spPr>
-          <a:xfrm>
-            <a:off x="1588818" y="3472061"/>
-            <a:ext cx="280219" cy="557970"/>
-          </a:xfrm>
-          <a:prstGeom prst="straightConnector1">
-            <a:avLst/>
-          </a:prstGeom>
-          <a:ln>
-            <a:solidFill>
-              <a:schemeClr val="tx1"/>
-            </a:solidFill>
-            <a:prstDash val="dash"/>
-            <a:tailEnd type="triangle"/>
-          </a:ln>
-        </p:spPr>
-        <p:style>
-          <a:lnRef idx="1">
-            <a:schemeClr val="accent1"/>
-          </a:lnRef>
-          <a:fillRef idx="0">
-            <a:schemeClr val="accent1"/>
-          </a:fillRef>
-          <a:effectRef idx="0">
-            <a:schemeClr val="accent1"/>
-          </a:effectRef>
-          <a:fontRef idx="minor">
-            <a:schemeClr val="tx1"/>
-          </a:fontRef>
-        </p:style>
-      </p:cxnSp>
       <p:cxnSp>
         <p:nvCxnSpPr>
           <p:cNvPr id="84" name="Curved Connector 83"/>
@@ -4277,7 +4016,7 @@
         <p:spPr>
           <a:xfrm>
             <a:off x="3622844" y="223629"/>
-            <a:ext cx="5259853" cy="369332"/>
+            <a:ext cx="5259853" cy="461665"/>
           </a:xfrm>
           <a:prstGeom prst="rect">
             <a:avLst/>
@@ -4292,23 +4031,25 @@
           <a:p>
             <a:pPr algn="ctr"/>
             <a:r>
-              <a:rPr lang="en-US" dirty="0" smtClean="0"/>
+              <a:rPr lang="en-US" sz="2400" dirty="0" smtClean="0"/>
               <a:t>Seismic Drone Data Acquisition System</a:t>
             </a:r>
-            <a:endParaRPr lang="en-US" dirty="0"/>
+            <a:endParaRPr lang="en-US" sz="2400" dirty="0"/>
           </a:p>
         </p:txBody>
       </p:sp>
       <p:cxnSp>
         <p:nvCxnSpPr>
           <p:cNvPr id="1072" name="Straight Arrow Connector 1071"/>
-          <p:cNvCxnSpPr/>
+          <p:cNvCxnSpPr>
+            <a:endCxn id="1075" idx="2"/>
+          </p:cNvCxnSpPr>
           <p:nvPr/>
         </p:nvCxnSpPr>
         <p:spPr>
           <a:xfrm flipH="1" flipV="1">
-            <a:off x="3276080" y="2094652"/>
-            <a:ext cx="458117" cy="1222141"/>
+            <a:off x="3219460" y="1744343"/>
+            <a:ext cx="681387" cy="2013038"/>
           </a:xfrm>
           <a:prstGeom prst="straightConnector1">
             <a:avLst/>
@@ -4343,8 +4084,8 @@
         </p:nvSpPr>
         <p:spPr>
           <a:xfrm>
-            <a:off x="2092236" y="1185127"/>
-            <a:ext cx="2794724" cy="923330"/>
+            <a:off x="1318743" y="728680"/>
+            <a:ext cx="3801434" cy="1015663"/>
           </a:xfrm>
           <a:prstGeom prst="rect">
             <a:avLst/>
@@ -4359,10 +4100,10 @@
           <a:p>
             <a:pPr algn="ctr"/>
             <a:r>
-              <a:rPr lang="en-US" dirty="0" smtClean="0"/>
+              <a:rPr lang="en-US" sz="2000" dirty="0" smtClean="0"/>
               <a:t>Seismic Drone(Geophone Sensors +Seismic Recorder + Data Storage +Battery)</a:t>
             </a:r>
-            <a:endParaRPr lang="en-US" dirty="0"/>
+            <a:endParaRPr lang="en-US" sz="2000" dirty="0"/>
           </a:p>
         </p:txBody>
       </p:sp>
@@ -4374,8 +4115,8 @@
         </p:nvCxnSpPr>
         <p:spPr>
           <a:xfrm flipV="1">
-            <a:off x="2013288" y="3130361"/>
-            <a:ext cx="0" cy="1002580"/>
+            <a:off x="1123461" y="4258260"/>
+            <a:ext cx="290354" cy="188090"/>
           </a:xfrm>
           <a:prstGeom prst="straightConnector1">
             <a:avLst/>
@@ -4410,8 +4151,8 @@
         </p:nvSpPr>
         <p:spPr>
           <a:xfrm>
-            <a:off x="1513151" y="2849459"/>
-            <a:ext cx="1178241" cy="369332"/>
+            <a:off x="1090815" y="3614964"/>
+            <a:ext cx="2184593" cy="707886"/>
           </a:xfrm>
           <a:prstGeom prst="rect">
             <a:avLst/>
@@ -4424,11 +4165,12 @@
           </a:bodyPr>
           <a:lstStyle/>
           <a:p>
-            <a:r>
-              <a:rPr lang="en-US" dirty="0" smtClean="0"/>
-              <a:t>Epicenter</a:t>
-            </a:r>
-            <a:endParaRPr lang="en-US" dirty="0"/>
+            <a:pPr algn="ctr"/>
+            <a:r>
+              <a:rPr lang="en-US" sz="2000" dirty="0" smtClean="0"/>
+              <a:t>Vibrating Plate(Epicenter)</a:t>
+            </a:r>
+            <a:endParaRPr lang="en-US" sz="2000" dirty="0"/>
           </a:p>
         </p:txBody>
       </p:sp>
@@ -4440,8 +4182,8 @@
         </p:nvCxnSpPr>
         <p:spPr>
           <a:xfrm flipV="1">
-            <a:off x="692488" y="2216211"/>
-            <a:ext cx="0" cy="1002580"/>
+            <a:off x="807564" y="2107174"/>
+            <a:ext cx="81440" cy="310815"/>
           </a:xfrm>
           <a:prstGeom prst="straightConnector1">
             <a:avLst/>
@@ -4476,8 +4218,8 @@
         </p:nvSpPr>
         <p:spPr>
           <a:xfrm>
-            <a:off x="115976" y="1690445"/>
-            <a:ext cx="1143958" cy="584775"/>
+            <a:off x="522090" y="1556642"/>
+            <a:ext cx="1795054" cy="830997"/>
           </a:xfrm>
           <a:prstGeom prst="rect">
             <a:avLst/>
@@ -4493,7 +4235,31 @@
             <a:pPr algn="ctr"/>
             <a:r>
               <a:rPr lang="en-US" sz="1600" dirty="0" smtClean="0"/>
-              <a:t>Source (Hammer)</a:t>
+              <a:t>Source </a:t>
+            </a:r>
+            <a:r>
+              <a:rPr lang="en-US" sz="1600" dirty="0" smtClean="0"/>
+              <a:t>(</a:t>
+            </a:r>
+            <a:r>
+              <a:rPr lang="en-US" sz="1600" dirty="0" err="1" smtClean="0"/>
+              <a:t>Veibroseis</a:t>
+            </a:r>
+            <a:r>
+              <a:rPr lang="en-US" sz="1600" dirty="0" smtClean="0"/>
+              <a:t>  </a:t>
+            </a:r>
+            <a:r>
+              <a:rPr lang="en-US" sz="1600" dirty="0"/>
+              <a:t>s</a:t>
+            </a:r>
+            <a:r>
+              <a:rPr lang="en-US" sz="1600" dirty="0" smtClean="0"/>
+              <a:t>etup, Motor with Piston</a:t>
+            </a:r>
+            <a:r>
+              <a:rPr lang="en-US" sz="1600" dirty="0" smtClean="0"/>
+              <a:t>)</a:t>
             </a:r>
             <a:endParaRPr lang="en-US" sz="1600" dirty="0"/>
           </a:p>
@@ -4507,8 +4273,8 @@
         </p:nvSpPr>
         <p:spPr>
           <a:xfrm>
-            <a:off x="9951547" y="4533780"/>
-            <a:ext cx="2003706" cy="707886"/>
+            <a:off x="9601204" y="4533780"/>
+            <a:ext cx="2354049" cy="830997"/>
           </a:xfrm>
           <a:prstGeom prst="rect">
             <a:avLst/>
@@ -4523,30 +4289,25 @@
           <a:p>
             <a:pPr algn="ctr"/>
             <a:r>
-              <a:rPr lang="en-US" sz="2000" b="1" dirty="0" smtClean="0">
+              <a:rPr lang="en-US" sz="2400" b="1" dirty="0" smtClean="0">
                 <a:solidFill>
                   <a:schemeClr val="bg1"/>
                 </a:solidFill>
               </a:rPr>
               <a:t>Vibrational </a:t>
             </a:r>
-            <a:endParaRPr lang="en-US" sz="2000" b="1" dirty="0" smtClean="0">
-              <a:solidFill>
-                <a:schemeClr val="bg1"/>
-              </a:solidFill>
-            </a:endParaRPr>
           </a:p>
           <a:p>
             <a:pPr algn="ctr"/>
             <a:r>
-              <a:rPr lang="en-US" sz="2000" b="1" dirty="0" smtClean="0">
+              <a:rPr lang="en-US" sz="2400" b="1" dirty="0" smtClean="0">
                 <a:solidFill>
                   <a:schemeClr val="bg1"/>
                 </a:solidFill>
               </a:rPr>
               <a:t>Waves</a:t>
             </a:r>
-            <a:endParaRPr lang="en-US" sz="2000" b="1" dirty="0">
+            <a:endParaRPr lang="en-US" sz="2400" b="1" dirty="0">
               <a:solidFill>
                 <a:schemeClr val="bg1"/>
               </a:solidFill>
@@ -4562,8 +4323,8 @@
         </p:nvSpPr>
         <p:spPr>
           <a:xfrm>
-            <a:off x="4835567" y="1349109"/>
-            <a:ext cx="1691134" cy="853440"/>
+            <a:off x="4522223" y="1635227"/>
+            <a:ext cx="706459" cy="458312"/>
           </a:xfrm>
           <a:prstGeom prst="curvedDownArrow">
             <a:avLst/>
@@ -4609,8 +4370,8 @@
         </p:nvGrpSpPr>
         <p:grpSpPr>
           <a:xfrm>
-            <a:off x="2549926" y="2948200"/>
-            <a:ext cx="2875742" cy="1960174"/>
+            <a:off x="3313172" y="3581131"/>
+            <a:ext cx="1344658" cy="1066273"/>
             <a:chOff x="2504255" y="2959892"/>
             <a:chExt cx="2875742" cy="1960174"/>
           </a:xfrm>
@@ -4624,7 +4385,7 @@
             <p:nvPr/>
           </p:nvPicPr>
           <p:blipFill rotWithShape="1">
-            <a:blip r:embed="rId3">
+            <a:blip r:embed="rId3" cstate="print">
               <a:extLst>
                 <a:ext uri="{28A0092B-C50C-407E-A947-70E740481C1C}">
                   <a14:useLocalDpi xmlns:a14="http://schemas.microsoft.com/office/drawing/2010/main" val="0"/>
@@ -5130,7 +4891,7 @@
         </p:nvGrpSpPr>
         <p:grpSpPr>
           <a:xfrm>
-            <a:off x="10440702" y="2078530"/>
+            <a:off x="11157878" y="2093859"/>
             <a:ext cx="448876" cy="2351861"/>
             <a:chOff x="2998842" y="2095715"/>
             <a:chExt cx="448876" cy="2351861"/>
@@ -5228,7 +4989,7 @@
         </p:nvGrpSpPr>
         <p:grpSpPr>
           <a:xfrm>
-            <a:off x="8932845" y="2094432"/>
+            <a:off x="10414798" y="2068438"/>
             <a:ext cx="448876" cy="2351861"/>
             <a:chOff x="2998842" y="2095715"/>
             <a:chExt cx="448876" cy="2351861"/>
@@ -5326,7 +5087,7 @@
         </p:nvGrpSpPr>
         <p:grpSpPr>
           <a:xfrm>
-            <a:off x="7261917" y="2087663"/>
+            <a:off x="5694394" y="2095977"/>
             <a:ext cx="448876" cy="2351861"/>
             <a:chOff x="2998842" y="2095715"/>
             <a:chExt cx="448876" cy="2351861"/>
@@ -5424,7 +5185,7 @@
         </p:nvGrpSpPr>
         <p:grpSpPr>
           <a:xfrm>
-            <a:off x="5646581" y="2074921"/>
+            <a:off x="4848122" y="2092015"/>
             <a:ext cx="448876" cy="2351861"/>
             <a:chOff x="2998842" y="2095715"/>
             <a:chExt cx="448876" cy="2351861"/>
@@ -5516,21 +5277,26 @@
       </p:grpSp>
       <p:sp>
         <p:nvSpPr>
-          <p:cNvPr id="111" name="Curved Down Arrow 110"/>
+          <p:cNvPr id="4" name="Rounded Rectangle 3"/>
           <p:cNvSpPr/>
           <p:nvPr/>
         </p:nvSpPr>
         <p:spPr>
           <a:xfrm>
-            <a:off x="8260413" y="1352749"/>
-            <a:ext cx="1691134" cy="853440"/>
-          </a:xfrm>
-          <a:prstGeom prst="curvedDownArrow">
+            <a:off x="540065" y="2354566"/>
+            <a:ext cx="619503" cy="1164638"/>
+          </a:xfrm>
+          <a:prstGeom prst="roundRect">
             <a:avLst/>
           </a:prstGeom>
           <a:solidFill>
-            <a:schemeClr val="tx1"/>
+            <a:srgbClr val="FF0000"/>
           </a:solidFill>
+          <a:ln>
+            <a:solidFill>
+              <a:schemeClr val="tx1"/>
+            </a:solidFill>
+          </a:ln>
         </p:spPr>
         <p:style>
           <a:lnRef idx="2">
@@ -5553,31 +5319,32 @@
           <a:lstStyle/>
           <a:p>
             <a:pPr algn="ctr"/>
-            <a:endParaRPr lang="en-US">
-              <a:solidFill>
-                <a:schemeClr val="tx1"/>
-              </a:solidFill>
-            </a:endParaRPr>
-          </a:p>
-        </p:txBody>
-      </p:sp>
-      <p:sp>
-        <p:nvSpPr>
-          <p:cNvPr id="112" name="Curved Down Arrow 111"/>
+            <a:endParaRPr lang="en-US"/>
+          </a:p>
+        </p:txBody>
+      </p:sp>
+      <p:sp>
+        <p:nvSpPr>
+          <p:cNvPr id="9" name="Rectangle 8"/>
           <p:cNvSpPr/>
           <p:nvPr/>
         </p:nvSpPr>
         <p:spPr>
           <a:xfrm>
-            <a:off x="6529770" y="1349109"/>
-            <a:ext cx="1691134" cy="853440"/>
-          </a:xfrm>
-          <a:prstGeom prst="curvedDownArrow">
+            <a:off x="768640" y="3068614"/>
+            <a:ext cx="166441" cy="875813"/>
+          </a:xfrm>
+          <a:prstGeom prst="rect">
             <a:avLst/>
           </a:prstGeom>
           <a:solidFill>
             <a:schemeClr val="tx1"/>
           </a:solidFill>
+          <a:ln>
+            <a:solidFill>
+              <a:schemeClr val="tx1"/>
+            </a:solidFill>
+          </a:ln>
         </p:spPr>
         <p:style>
           <a:lnRef idx="2">
@@ -5600,31 +5367,146 @@
           <a:lstStyle/>
           <a:p>
             <a:pPr algn="ctr"/>
-            <a:endParaRPr lang="en-US">
+            <a:endParaRPr lang="en-US"/>
+          </a:p>
+        </p:txBody>
+      </p:sp>
+      <p:grpSp>
+        <p:nvGrpSpPr>
+          <p:cNvPr id="17" name="Group 16"/>
+          <p:cNvGrpSpPr/>
+          <p:nvPr/>
+        </p:nvGrpSpPr>
+        <p:grpSpPr>
+          <a:xfrm>
+            <a:off x="507729" y="4302393"/>
+            <a:ext cx="619503" cy="294380"/>
+            <a:chOff x="524953" y="4176476"/>
+            <a:chExt cx="619503" cy="294380"/>
+          </a:xfrm>
+        </p:grpSpPr>
+        <p:sp>
+          <p:nvSpPr>
+            <p:cNvPr id="12" name="Oval 11"/>
+            <p:cNvSpPr/>
+            <p:nvPr/>
+          </p:nvSpPr>
+          <p:spPr>
+            <a:xfrm>
+              <a:off x="524953" y="4176476"/>
+              <a:ext cx="619503" cy="294380"/>
+            </a:xfrm>
+            <a:prstGeom prst="ellipse">
+              <a:avLst/>
+            </a:prstGeom>
+            <a:solidFill>
+              <a:schemeClr val="tx1"/>
+            </a:solidFill>
+            <a:ln>
               <a:solidFill>
                 <a:schemeClr val="tx1"/>
               </a:solidFill>
-            </a:endParaRPr>
-          </a:p>
-        </p:txBody>
-      </p:sp>
-      <p:sp>
-        <p:nvSpPr>
-          <p:cNvPr id="117" name="Curved Down Arrow 116"/>
+            </a:ln>
+          </p:spPr>
+          <p:style>
+            <a:lnRef idx="2">
+              <a:schemeClr val="accent1">
+                <a:shade val="50000"/>
+              </a:schemeClr>
+            </a:lnRef>
+            <a:fillRef idx="1">
+              <a:schemeClr val="accent1"/>
+            </a:fillRef>
+            <a:effectRef idx="0">
+              <a:schemeClr val="accent1"/>
+            </a:effectRef>
+            <a:fontRef idx="minor">
+              <a:schemeClr val="lt1"/>
+            </a:fontRef>
+          </p:style>
+          <p:txBody>
+            <a:bodyPr rtlCol="0" anchor="ctr"/>
+            <a:lstStyle/>
+            <a:p>
+              <a:pPr algn="ctr"/>
+              <a:endParaRPr lang="en-US"/>
+            </a:p>
+          </p:txBody>
+        </p:sp>
+        <p:sp>
+          <p:nvSpPr>
+            <p:cNvPr id="13" name="Oval 12"/>
+            <p:cNvSpPr/>
+            <p:nvPr/>
+          </p:nvSpPr>
+          <p:spPr>
+            <a:xfrm>
+              <a:off x="741692" y="4277379"/>
+              <a:ext cx="164536" cy="86937"/>
+            </a:xfrm>
+            <a:prstGeom prst="ellipse">
+              <a:avLst/>
+            </a:prstGeom>
+            <a:solidFill>
+              <a:schemeClr val="bg1"/>
+            </a:solidFill>
+            <a:ln>
+              <a:solidFill>
+                <a:schemeClr val="tx1"/>
+              </a:solidFill>
+            </a:ln>
+          </p:spPr>
+          <p:style>
+            <a:lnRef idx="2">
+              <a:schemeClr val="accent1">
+                <a:shade val="50000"/>
+              </a:schemeClr>
+            </a:lnRef>
+            <a:fillRef idx="1">
+              <a:schemeClr val="accent1"/>
+            </a:fillRef>
+            <a:effectRef idx="0">
+              <a:schemeClr val="accent1"/>
+            </a:effectRef>
+            <a:fontRef idx="minor">
+              <a:schemeClr val="lt1"/>
+            </a:fontRef>
+          </p:style>
+          <p:txBody>
+            <a:bodyPr rtlCol="0" anchor="ctr"/>
+            <a:lstStyle/>
+            <a:p>
+              <a:pPr algn="ctr"/>
+              <a:endParaRPr lang="en-US"/>
+            </a:p>
+          </p:txBody>
+        </p:sp>
+      </p:grpSp>
+      <p:sp>
+        <p:nvSpPr>
+          <p:cNvPr id="15" name="Rectangle 14"/>
           <p:cNvSpPr/>
           <p:nvPr/>
         </p:nvSpPr>
         <p:spPr>
           <a:xfrm>
-            <a:off x="10035110" y="1366871"/>
-            <a:ext cx="1691134" cy="853440"/>
-          </a:xfrm>
-          <a:prstGeom prst="curvedDownArrow">
+            <a:off x="0" y="1457061"/>
+            <a:ext cx="540065" cy="2486684"/>
+          </a:xfrm>
+          <a:prstGeom prst="rect">
             <a:avLst/>
           </a:prstGeom>
           <a:solidFill>
-            <a:schemeClr val="tx1"/>
+            <a:schemeClr val="accent3">
+              <a:lumMod val="60000"/>
+              <a:lumOff val="40000"/>
+            </a:schemeClr>
           </a:solidFill>
+          <a:ln>
+            <a:solidFill>
+              <a:schemeClr val="tx1"/>
+            </a:solidFill>
+          </a:ln>
         </p:spPr>
         <p:style>
           <a:lnRef idx="2">
@@ -5647,11 +5529,473 @@
           <a:lstStyle/>
           <a:p>
             <a:pPr algn="ctr"/>
+            <a:endParaRPr lang="en-US"/>
+          </a:p>
+        </p:txBody>
+      </p:sp>
+      <p:sp>
+        <p:nvSpPr>
+          <p:cNvPr id="16" name="Oval 15"/>
+          <p:cNvSpPr/>
+          <p:nvPr/>
+        </p:nvSpPr>
+        <p:spPr>
+          <a:xfrm>
+            <a:off x="-113205" y="3941085"/>
+            <a:ext cx="496007" cy="493803"/>
+          </a:xfrm>
+          <a:prstGeom prst="ellipse">
+            <a:avLst/>
+          </a:prstGeom>
+          <a:solidFill>
+            <a:schemeClr val="tx1"/>
+          </a:solidFill>
+          <a:ln>
+            <a:solidFill>
+              <a:schemeClr val="tx1"/>
+            </a:solidFill>
+          </a:ln>
+        </p:spPr>
+        <p:style>
+          <a:lnRef idx="2">
+            <a:schemeClr val="accent1">
+              <a:shade val="50000"/>
+            </a:schemeClr>
+          </a:lnRef>
+          <a:fillRef idx="1">
+            <a:schemeClr val="accent1"/>
+          </a:fillRef>
+          <a:effectRef idx="0">
+            <a:schemeClr val="accent1"/>
+          </a:effectRef>
+          <a:fontRef idx="minor">
+            <a:schemeClr val="lt1"/>
+          </a:fontRef>
+        </p:style>
+        <p:txBody>
+          <a:bodyPr rtlCol="0" anchor="ctr"/>
+          <a:lstStyle/>
+          <a:p>
+            <a:pPr algn="ctr"/>
+            <a:endParaRPr lang="en-US"/>
+          </a:p>
+        </p:txBody>
+      </p:sp>
+      <p:sp>
+        <p:nvSpPr>
+          <p:cNvPr id="118" name="Curved Down Arrow 117"/>
+          <p:cNvSpPr/>
+          <p:nvPr/>
+        </p:nvSpPr>
+        <p:spPr>
+          <a:xfrm>
+            <a:off x="5496828" y="1644036"/>
+            <a:ext cx="706459" cy="458312"/>
+          </a:xfrm>
+          <a:prstGeom prst="curvedDownArrow">
+            <a:avLst/>
+          </a:prstGeom>
+          <a:solidFill>
+            <a:schemeClr val="tx1"/>
+          </a:solidFill>
+        </p:spPr>
+        <p:style>
+          <a:lnRef idx="2">
+            <a:schemeClr val="accent1">
+              <a:shade val="50000"/>
+            </a:schemeClr>
+          </a:lnRef>
+          <a:fillRef idx="1">
+            <a:schemeClr val="accent1"/>
+          </a:fillRef>
+          <a:effectRef idx="0">
+            <a:schemeClr val="accent1"/>
+          </a:effectRef>
+          <a:fontRef idx="minor">
+            <a:schemeClr val="lt1"/>
+          </a:fontRef>
+        </p:style>
+        <p:txBody>
+          <a:bodyPr rtlCol="0" anchor="ctr"/>
+          <a:lstStyle/>
+          <a:p>
+            <a:pPr algn="ctr"/>
             <a:endParaRPr lang="en-US">
               <a:solidFill>
                 <a:schemeClr val="tx1"/>
               </a:solidFill>
             </a:endParaRPr>
+          </a:p>
+        </p:txBody>
+      </p:sp>
+      <p:sp>
+        <p:nvSpPr>
+          <p:cNvPr id="119" name="Curved Down Arrow 118"/>
+          <p:cNvSpPr/>
+          <p:nvPr/>
+        </p:nvSpPr>
+        <p:spPr>
+          <a:xfrm>
+            <a:off x="6361091" y="1635227"/>
+            <a:ext cx="706459" cy="458312"/>
+          </a:xfrm>
+          <a:prstGeom prst="curvedDownArrow">
+            <a:avLst/>
+          </a:prstGeom>
+          <a:solidFill>
+            <a:schemeClr val="tx1"/>
+          </a:solidFill>
+        </p:spPr>
+        <p:style>
+          <a:lnRef idx="2">
+            <a:schemeClr val="accent1">
+              <a:shade val="50000"/>
+            </a:schemeClr>
+          </a:lnRef>
+          <a:fillRef idx="1">
+            <a:schemeClr val="accent1"/>
+          </a:fillRef>
+          <a:effectRef idx="0">
+            <a:schemeClr val="accent1"/>
+          </a:effectRef>
+          <a:fontRef idx="minor">
+            <a:schemeClr val="lt1"/>
+          </a:fontRef>
+        </p:style>
+        <p:txBody>
+          <a:bodyPr rtlCol="0" anchor="ctr"/>
+          <a:lstStyle/>
+          <a:p>
+            <a:pPr algn="ctr"/>
+            <a:endParaRPr lang="en-US">
+              <a:solidFill>
+                <a:schemeClr val="tx1"/>
+              </a:solidFill>
+            </a:endParaRPr>
+          </a:p>
+        </p:txBody>
+      </p:sp>
+      <p:cxnSp>
+        <p:nvCxnSpPr>
+          <p:cNvPr id="24" name="Straight Connector 23"/>
+          <p:cNvCxnSpPr/>
+          <p:nvPr/>
+        </p:nvCxnSpPr>
+        <p:spPr>
+          <a:xfrm>
+            <a:off x="7067550" y="1744343"/>
+            <a:ext cx="3062568" cy="0"/>
+          </a:xfrm>
+          <a:prstGeom prst="line">
+            <a:avLst/>
+          </a:prstGeom>
+          <a:ln w="28575">
+            <a:solidFill>
+              <a:schemeClr val="tx1"/>
+            </a:solidFill>
+            <a:prstDash val="dash"/>
+          </a:ln>
+        </p:spPr>
+        <p:style>
+          <a:lnRef idx="1">
+            <a:schemeClr val="accent1"/>
+          </a:lnRef>
+          <a:fillRef idx="0">
+            <a:schemeClr val="accent1"/>
+          </a:fillRef>
+          <a:effectRef idx="0">
+            <a:schemeClr val="accent1"/>
+          </a:effectRef>
+          <a:fontRef idx="minor">
+            <a:schemeClr val="tx1"/>
+          </a:fontRef>
+        </p:style>
+      </p:cxnSp>
+      <p:sp>
+        <p:nvSpPr>
+          <p:cNvPr id="120" name="Curved Down Arrow 119"/>
+          <p:cNvSpPr/>
+          <p:nvPr/>
+        </p:nvSpPr>
+        <p:spPr>
+          <a:xfrm>
+            <a:off x="10979634" y="1577739"/>
+            <a:ext cx="706459" cy="458312"/>
+          </a:xfrm>
+          <a:prstGeom prst="curvedDownArrow">
+            <a:avLst/>
+          </a:prstGeom>
+          <a:solidFill>
+            <a:schemeClr val="tx1"/>
+          </a:solidFill>
+        </p:spPr>
+        <p:style>
+          <a:lnRef idx="2">
+            <a:schemeClr val="accent1">
+              <a:shade val="50000"/>
+            </a:schemeClr>
+          </a:lnRef>
+          <a:fillRef idx="1">
+            <a:schemeClr val="accent1"/>
+          </a:fillRef>
+          <a:effectRef idx="0">
+            <a:schemeClr val="accent1"/>
+          </a:effectRef>
+          <a:fontRef idx="minor">
+            <a:schemeClr val="lt1"/>
+          </a:fontRef>
+        </p:style>
+        <p:txBody>
+          <a:bodyPr rtlCol="0" anchor="ctr"/>
+          <a:lstStyle/>
+          <a:p>
+            <a:pPr algn="ctr"/>
+            <a:endParaRPr lang="en-US">
+              <a:solidFill>
+                <a:schemeClr val="tx1"/>
+              </a:solidFill>
+            </a:endParaRPr>
+          </a:p>
+        </p:txBody>
+      </p:sp>
+      <p:sp>
+        <p:nvSpPr>
+          <p:cNvPr id="121" name="Curved Down Arrow 120"/>
+          <p:cNvSpPr/>
+          <p:nvPr/>
+        </p:nvSpPr>
+        <p:spPr>
+          <a:xfrm>
+            <a:off x="10157176" y="1587131"/>
+            <a:ext cx="706459" cy="458312"/>
+          </a:xfrm>
+          <a:prstGeom prst="curvedDownArrow">
+            <a:avLst/>
+          </a:prstGeom>
+          <a:solidFill>
+            <a:schemeClr val="tx1"/>
+          </a:solidFill>
+        </p:spPr>
+        <p:style>
+          <a:lnRef idx="2">
+            <a:schemeClr val="accent1">
+              <a:shade val="50000"/>
+            </a:schemeClr>
+          </a:lnRef>
+          <a:fillRef idx="1">
+            <a:schemeClr val="accent1"/>
+          </a:fillRef>
+          <a:effectRef idx="0">
+            <a:schemeClr val="accent1"/>
+          </a:effectRef>
+          <a:fontRef idx="minor">
+            <a:schemeClr val="lt1"/>
+          </a:fontRef>
+        </p:style>
+        <p:txBody>
+          <a:bodyPr rtlCol="0" anchor="ctr"/>
+          <a:lstStyle/>
+          <a:p>
+            <a:pPr algn="ctr"/>
+            <a:endParaRPr lang="en-US">
+              <a:solidFill>
+                <a:schemeClr val="tx1"/>
+              </a:solidFill>
+            </a:endParaRPr>
+          </a:p>
+        </p:txBody>
+      </p:sp>
+      <p:cxnSp>
+        <p:nvCxnSpPr>
+          <p:cNvPr id="122" name="Straight Connector 121"/>
+          <p:cNvCxnSpPr/>
+          <p:nvPr/>
+        </p:nvCxnSpPr>
+        <p:spPr>
+          <a:xfrm flipV="1">
+            <a:off x="6158764" y="3274316"/>
+            <a:ext cx="3912462" cy="6765"/>
+          </a:xfrm>
+          <a:prstGeom prst="line">
+            <a:avLst/>
+          </a:prstGeom>
+          <a:ln w="28575">
+            <a:solidFill>
+              <a:schemeClr val="tx1"/>
+            </a:solidFill>
+            <a:prstDash val="dash"/>
+          </a:ln>
+        </p:spPr>
+        <p:style>
+          <a:lnRef idx="1">
+            <a:schemeClr val="accent1"/>
+          </a:lnRef>
+          <a:fillRef idx="0">
+            <a:schemeClr val="accent1"/>
+          </a:fillRef>
+          <a:effectRef idx="0">
+            <a:schemeClr val="accent1"/>
+          </a:effectRef>
+          <a:fontRef idx="minor">
+            <a:schemeClr val="tx1"/>
+          </a:fontRef>
+        </p:style>
+      </p:cxnSp>
+      <p:sp>
+        <p:nvSpPr>
+          <p:cNvPr id="26" name="TextBox 25"/>
+          <p:cNvSpPr txBox="1"/>
+          <p:nvPr/>
+        </p:nvSpPr>
+        <p:spPr>
+          <a:xfrm>
+            <a:off x="4078691" y="2417989"/>
+            <a:ext cx="363839" cy="369332"/>
+          </a:xfrm>
+          <a:prstGeom prst="rect">
+            <a:avLst/>
+          </a:prstGeom>
+          <a:noFill/>
+        </p:spPr>
+        <p:txBody>
+          <a:bodyPr wrap="square" rtlCol="0">
+            <a:spAutoFit/>
+          </a:bodyPr>
+          <a:lstStyle/>
+          <a:p>
+            <a:r>
+              <a:rPr lang="en-US" dirty="0" smtClean="0"/>
+              <a:t>1.</a:t>
+            </a:r>
+            <a:endParaRPr lang="en-US" dirty="0"/>
+          </a:p>
+        </p:txBody>
+      </p:sp>
+      <p:sp>
+        <p:nvSpPr>
+          <p:cNvPr id="123" name="TextBox 122"/>
+          <p:cNvSpPr txBox="1"/>
+          <p:nvPr/>
+        </p:nvSpPr>
+        <p:spPr>
+          <a:xfrm>
+            <a:off x="4876303" y="2417989"/>
+            <a:ext cx="363839" cy="369332"/>
+          </a:xfrm>
+          <a:prstGeom prst="rect">
+            <a:avLst/>
+          </a:prstGeom>
+          <a:noFill/>
+        </p:spPr>
+        <p:txBody>
+          <a:bodyPr wrap="square" rtlCol="0">
+            <a:spAutoFit/>
+          </a:bodyPr>
+          <a:lstStyle/>
+          <a:p>
+            <a:r>
+              <a:rPr lang="en-US" dirty="0"/>
+              <a:t>2</a:t>
+            </a:r>
+            <a:r>
+              <a:rPr lang="en-US" dirty="0" smtClean="0"/>
+              <a:t>.</a:t>
+            </a:r>
+            <a:endParaRPr lang="en-US" dirty="0"/>
+          </a:p>
+        </p:txBody>
+      </p:sp>
+      <p:sp>
+        <p:nvSpPr>
+          <p:cNvPr id="124" name="TextBox 123"/>
+          <p:cNvSpPr txBox="1"/>
+          <p:nvPr/>
+        </p:nvSpPr>
+        <p:spPr>
+          <a:xfrm>
+            <a:off x="11162937" y="2409925"/>
+            <a:ext cx="523156" cy="369332"/>
+          </a:xfrm>
+          <a:prstGeom prst="rect">
+            <a:avLst/>
+          </a:prstGeom>
+          <a:noFill/>
+        </p:spPr>
+        <p:txBody>
+          <a:bodyPr wrap="square" rtlCol="0">
+            <a:spAutoFit/>
+          </a:bodyPr>
+          <a:lstStyle/>
+          <a:p>
+            <a:r>
+              <a:rPr lang="en-US" dirty="0" smtClean="0"/>
+              <a:t>24.</a:t>
+            </a:r>
+            <a:endParaRPr lang="en-US" dirty="0"/>
+          </a:p>
+        </p:txBody>
+      </p:sp>
+      <p:sp>
+        <p:nvSpPr>
+          <p:cNvPr id="125" name="TextBox 124"/>
+          <p:cNvSpPr txBox="1"/>
+          <p:nvPr/>
+        </p:nvSpPr>
+        <p:spPr>
+          <a:xfrm>
+            <a:off x="5665653" y="2417989"/>
+            <a:ext cx="363839" cy="369332"/>
+          </a:xfrm>
+          <a:prstGeom prst="rect">
+            <a:avLst/>
+          </a:prstGeom>
+          <a:noFill/>
+        </p:spPr>
+        <p:txBody>
+          <a:bodyPr wrap="square" rtlCol="0">
+            <a:spAutoFit/>
+          </a:bodyPr>
+          <a:lstStyle/>
+          <a:p>
+            <a:r>
+              <a:rPr lang="en-US" dirty="0"/>
+              <a:t>3</a:t>
+            </a:r>
+            <a:r>
+              <a:rPr lang="en-US" dirty="0" smtClean="0"/>
+              <a:t>.</a:t>
+            </a:r>
+            <a:endParaRPr lang="en-US" dirty="0"/>
+          </a:p>
+        </p:txBody>
+      </p:sp>
+      <p:sp>
+        <p:nvSpPr>
+          <p:cNvPr id="126" name="TextBox 125"/>
+          <p:cNvSpPr txBox="1"/>
+          <p:nvPr/>
+        </p:nvSpPr>
+        <p:spPr>
+          <a:xfrm>
+            <a:off x="10414388" y="2412640"/>
+            <a:ext cx="565245" cy="369332"/>
+          </a:xfrm>
+          <a:prstGeom prst="rect">
+            <a:avLst/>
+          </a:prstGeom>
+          <a:noFill/>
+        </p:spPr>
+        <p:txBody>
+          <a:bodyPr wrap="square" rtlCol="0">
+            <a:spAutoFit/>
+          </a:bodyPr>
+          <a:lstStyle/>
+          <a:p>
+            <a:r>
+              <a:rPr lang="en-US" dirty="0" smtClean="0"/>
+              <a:t>23.</a:t>
+            </a:r>
+            <a:endParaRPr lang="en-US" dirty="0"/>
           </a:p>
         </p:txBody>
       </p:sp>

</xml_diff>